<commit_message>
Finished first version of presentation
</commit_message>
<xml_diff>
--- a/presentazione_tesi.pptx
+++ b/presentazione_tesi.pptx
@@ -6,17 +6,18 @@
   </p:sldMasterIdLst>
   <p:sldIdLst>
     <p:sldId id="256" r:id="rId2"/>
-    <p:sldId id="257" r:id="rId3"/>
-    <p:sldId id="259" r:id="rId4"/>
-    <p:sldId id="260" r:id="rId5"/>
-    <p:sldId id="267" r:id="rId6"/>
-    <p:sldId id="262" r:id="rId7"/>
-    <p:sldId id="261" r:id="rId8"/>
-    <p:sldId id="263" r:id="rId9"/>
-    <p:sldId id="264" r:id="rId10"/>
-    <p:sldId id="265" r:id="rId11"/>
-    <p:sldId id="266" r:id="rId12"/>
-    <p:sldId id="258" r:id="rId13"/>
+    <p:sldId id="258" r:id="rId3"/>
+    <p:sldId id="257" r:id="rId4"/>
+    <p:sldId id="259" r:id="rId5"/>
+    <p:sldId id="268" r:id="rId6"/>
+    <p:sldId id="260" r:id="rId7"/>
+    <p:sldId id="267" r:id="rId8"/>
+    <p:sldId id="262" r:id="rId9"/>
+    <p:sldId id="261" r:id="rId10"/>
+    <p:sldId id="263" r:id="rId11"/>
+    <p:sldId id="264" r:id="rId12"/>
+    <p:sldId id="265" r:id="rId13"/>
+    <p:sldId id="266" r:id="rId14"/>
   </p:sldIdLst>
   <p:sldSz cx="12192000" cy="6858000"/>
   <p:notesSz cx="6858000" cy="9144000"/>
@@ -121,8 +122,10 @@
         <p14:section name="Untitled Section" id="{21A2FA0F-2544-4AF9-B059-0A24B0277048}">
           <p14:sldIdLst>
             <p14:sldId id="256"/>
+            <p14:sldId id="258"/>
             <p14:sldId id="257"/>
             <p14:sldId id="259"/>
+            <p14:sldId id="268"/>
             <p14:sldId id="260"/>
             <p14:sldId id="267"/>
             <p14:sldId id="262"/>
@@ -131,10 +134,12 @@
             <p14:sldId id="264"/>
             <p14:sldId id="265"/>
             <p14:sldId id="266"/>
-            <p14:sldId id="258"/>
           </p14:sldIdLst>
         </p14:section>
       </p14:sectionLst>
+    </p:ext>
+    <p:ext uri="{EFAFB233-063F-42B5-8137-9DF3F51BA10A}">
+      <p15:sldGuideLst xmlns:p15="http://schemas.microsoft.com/office/powerpoint/2012/main"/>
     </p:ext>
   </p:extLst>
 </p:presentation>
@@ -329,7 +334,7 @@
             <a:fld id="{B61BEF0D-F0BB-DE4B-95CE-6DB70DBA9567}" type="datetimeFigureOut">
               <a:rPr lang="en-US" dirty="0"/>
               <a:pPr/>
-              <a:t>7/1/2019</a:t>
+              <a:t>7/2/2019</a:t>
             </a:fld>
             <a:endParaRPr lang="en-US" dirty="0"/>
           </a:p>
@@ -664,7 +669,7 @@
             <a:fld id="{B61BEF0D-F0BB-DE4B-95CE-6DB70DBA9567}" type="datetimeFigureOut">
               <a:rPr lang="en-US" dirty="0"/>
               <a:pPr/>
-              <a:t>7/1/2019</a:t>
+              <a:t>7/2/2019</a:t>
             </a:fld>
             <a:endParaRPr lang="en-US" dirty="0"/>
           </a:p>
@@ -1062,7 +1067,7 @@
             <a:fld id="{B61BEF0D-F0BB-DE4B-95CE-6DB70DBA9567}" type="datetimeFigureOut">
               <a:rPr lang="en-US" dirty="0"/>
               <a:pPr/>
-              <a:t>7/1/2019</a:t>
+              <a:t>7/2/2019</a:t>
             </a:fld>
             <a:endParaRPr lang="en-US" dirty="0"/>
           </a:p>
@@ -1395,7 +1400,7 @@
             <a:fld id="{B61BEF0D-F0BB-DE4B-95CE-6DB70DBA9567}" type="datetimeFigureOut">
               <a:rPr lang="en-US" dirty="0"/>
               <a:pPr/>
-              <a:t>7/1/2019</a:t>
+              <a:t>7/2/2019</a:t>
             </a:fld>
             <a:endParaRPr lang="en-US" dirty="0"/>
           </a:p>
@@ -1712,7 +1717,7 @@
             <a:fld id="{B61BEF0D-F0BB-DE4B-95CE-6DB70DBA9567}" type="datetimeFigureOut">
               <a:rPr lang="en-US" dirty="0"/>
               <a:pPr/>
-              <a:t>7/1/2019</a:t>
+              <a:t>7/2/2019</a:t>
             </a:fld>
             <a:endParaRPr lang="en-US" dirty="0"/>
           </a:p>
@@ -2105,7 +2110,7 @@
             <a:fld id="{B61BEF0D-F0BB-DE4B-95CE-6DB70DBA9567}" type="datetimeFigureOut">
               <a:rPr lang="en-US" dirty="0"/>
               <a:pPr/>
-              <a:t>7/1/2019</a:t>
+              <a:t>7/2/2019</a:t>
             </a:fld>
             <a:endParaRPr lang="en-US" dirty="0"/>
           </a:p>
@@ -2359,7 +2364,7 @@
             <a:fld id="{B61BEF0D-F0BB-DE4B-95CE-6DB70DBA9567}" type="datetimeFigureOut">
               <a:rPr lang="en-US" dirty="0"/>
               <a:pPr/>
-              <a:t>7/1/2019</a:t>
+              <a:t>7/2/2019</a:t>
             </a:fld>
             <a:endParaRPr lang="en-US" dirty="0"/>
           </a:p>
@@ -2618,7 +2623,7 @@
             <a:fld id="{B61BEF0D-F0BB-DE4B-95CE-6DB70DBA9567}" type="datetimeFigureOut">
               <a:rPr lang="en-US" dirty="0"/>
               <a:pPr/>
-              <a:t>7/1/2019</a:t>
+              <a:t>7/2/2019</a:t>
             </a:fld>
             <a:endParaRPr lang="en-US" dirty="0"/>
           </a:p>
@@ -2877,7 +2882,7 @@
             <a:fld id="{B61BEF0D-F0BB-DE4B-95CE-6DB70DBA9567}" type="datetimeFigureOut">
               <a:rPr lang="en-US" dirty="0"/>
               <a:pPr/>
-              <a:t>7/1/2019</a:t>
+              <a:t>7/2/2019</a:t>
             </a:fld>
             <a:endParaRPr lang="en-US" dirty="0"/>
           </a:p>
@@ -3203,7 +3208,7 @@
             <a:fld id="{B61BEF0D-F0BB-DE4B-95CE-6DB70DBA9567}" type="datetimeFigureOut">
               <a:rPr lang="en-US" dirty="0"/>
               <a:pPr/>
-              <a:t>7/1/2019</a:t>
+              <a:t>7/2/2019</a:t>
             </a:fld>
             <a:endParaRPr lang="en-US" dirty="0"/>
           </a:p>
@@ -3523,7 +3528,7 @@
             <a:fld id="{B61BEF0D-F0BB-DE4B-95CE-6DB70DBA9567}" type="datetimeFigureOut">
               <a:rPr lang="en-US" dirty="0"/>
               <a:pPr/>
-              <a:t>7/1/2019</a:t>
+              <a:t>7/2/2019</a:t>
             </a:fld>
             <a:endParaRPr lang="en-US" dirty="0"/>
           </a:p>
@@ -3977,7 +3982,7 @@
             <a:fld id="{B61BEF0D-F0BB-DE4B-95CE-6DB70DBA9567}" type="datetimeFigureOut">
               <a:rPr lang="en-US" dirty="0"/>
               <a:pPr/>
-              <a:t>7/1/2019</a:t>
+              <a:t>7/2/2019</a:t>
             </a:fld>
             <a:endParaRPr lang="en-US" dirty="0"/>
           </a:p>
@@ -4179,7 +4184,7 @@
             <a:fld id="{B61BEF0D-F0BB-DE4B-95CE-6DB70DBA9567}" type="datetimeFigureOut">
               <a:rPr lang="en-US" dirty="0"/>
               <a:pPr/>
-              <a:t>7/1/2019</a:t>
+              <a:t>7/2/2019</a:t>
             </a:fld>
             <a:endParaRPr lang="en-US" dirty="0"/>
           </a:p>
@@ -4353,7 +4358,7 @@
             <a:fld id="{B61BEF0D-F0BB-DE4B-95CE-6DB70DBA9567}" type="datetimeFigureOut">
               <a:rPr lang="en-US" dirty="0"/>
               <a:pPr/>
-              <a:t>7/1/2019</a:t>
+              <a:t>7/2/2019</a:t>
             </a:fld>
             <a:endParaRPr lang="en-US" dirty="0"/>
           </a:p>
@@ -4683,7 +4688,7 @@
             <a:fld id="{B61BEF0D-F0BB-DE4B-95CE-6DB70DBA9567}" type="datetimeFigureOut">
               <a:rPr lang="en-US" dirty="0"/>
               <a:pPr/>
-              <a:t>7/1/2019</a:t>
+              <a:t>7/2/2019</a:t>
             </a:fld>
             <a:endParaRPr lang="en-US" dirty="0"/>
           </a:p>
@@ -5025,7 +5030,7 @@
             <a:fld id="{B61BEF0D-F0BB-DE4B-95CE-6DB70DBA9567}" type="datetimeFigureOut">
               <a:rPr lang="en-US" dirty="0"/>
               <a:pPr/>
-              <a:t>7/1/2019</a:t>
+              <a:t>7/2/2019</a:t>
             </a:fld>
             <a:endParaRPr lang="en-US" dirty="0"/>
           </a:p>
@@ -7139,7 +7144,7 @@
             <a:fld id="{B61BEF0D-F0BB-DE4B-95CE-6DB70DBA9567}" type="datetimeFigureOut">
               <a:rPr lang="en-US" dirty="0"/>
               <a:pPr/>
-              <a:t>7/1/2019</a:t>
+              <a:t>7/2/2019</a:t>
             </a:fld>
             <a:endParaRPr lang="en-US" dirty="0"/>
           </a:p>
@@ -7841,7 +7846,7 @@
           <p:cNvPr id="2" name="Title 1">
             <a:extLst>
               <a:ext uri="{FF2B5EF4-FFF2-40B4-BE49-F238E27FC236}">
-                <a16:creationId xmlns:a16="http://schemas.microsoft.com/office/drawing/2014/main" id="{5A3EA494-A7DC-4D0E-90A8-D05FCC66E925}"/>
+                <a16:creationId xmlns:a16="http://schemas.microsoft.com/office/drawing/2014/main" id="{880234B8-62BD-4942-89C3-807122800625}"/>
               </a:ext>
             </a:extLst>
           </p:cNvPr>
@@ -7859,7 +7864,7 @@
           <a:p>
             <a:r>
               <a:rPr lang="it-IT" dirty="0"/>
-              <a:t>Conclusioni</a:t>
+              <a:t>Algoritmo di tracking</a:t>
             </a:r>
           </a:p>
         </p:txBody>
@@ -7869,7 +7874,7 @@
           <p:cNvPr id="3" name="Content Placeholder 2">
             <a:extLst>
               <a:ext uri="{FF2B5EF4-FFF2-40B4-BE49-F238E27FC236}">
-                <a16:creationId xmlns:a16="http://schemas.microsoft.com/office/drawing/2014/main" id="{C5E3C86A-8CEF-476E-969B-197B4F8CAADF}"/>
+                <a16:creationId xmlns:a16="http://schemas.microsoft.com/office/drawing/2014/main" id="{BE7E5635-38AB-42B2-BE9B-80154B2A7B02}"/>
               </a:ext>
             </a:extLst>
           </p:cNvPr>
@@ -7880,19 +7885,85 @@
             <p:ph idx="1"/>
           </p:nvPr>
         </p:nvSpPr>
-        <p:spPr/>
+        <p:spPr>
+          <a:xfrm>
+            <a:off x="2589212" y="2133600"/>
+            <a:ext cx="5702532" cy="3777622"/>
+          </a:xfrm>
+        </p:spPr>
         <p:txBody>
           <a:bodyPr/>
           <a:lstStyle/>
           <a:p>
-            <a:endParaRPr lang="it-IT"/>
-          </a:p>
-        </p:txBody>
-      </p:sp>
+            <a:r>
+              <a:rPr lang="it-IT" dirty="0"/>
+              <a:t>Effettuare una detection per ogni frame</a:t>
+            </a:r>
+          </a:p>
+          <a:p>
+            <a:r>
+              <a:rPr lang="it-IT" dirty="0"/>
+              <a:t>Creare un tracker per ogni elemento da tracciare</a:t>
+            </a:r>
+          </a:p>
+          <a:p>
+            <a:r>
+              <a:rPr lang="it-IT" dirty="0"/>
+              <a:t>Ogni tracker utilizza uno storico delle ultime locazioni raggiunte dall’oggetto da esso tracciato per prevedere quella successiva</a:t>
+            </a:r>
+          </a:p>
+          <a:p>
+            <a:pPr lvl="1">
+              <a:buFont typeface="Wingdings" panose="05000000000000000000" pitchFamily="2" charset="2"/>
+              <a:buChar char="§"/>
+            </a:pPr>
+            <a:r>
+              <a:rPr lang="it-IT" dirty="0"/>
+              <a:t>Filtro di Kalman</a:t>
+            </a:r>
+          </a:p>
+          <a:p>
+            <a:r>
+              <a:rPr lang="it-IT" dirty="0"/>
+              <a:t>Assegnare ad ogni tracker il rispettivo oggetto tracciato individuato tramite la nuova detection</a:t>
+            </a:r>
+          </a:p>
+        </p:txBody>
+      </p:sp>
+      <p:pic>
+        <p:nvPicPr>
+          <p:cNvPr id="5" name="Picture 4">
+            <a:extLst>
+              <a:ext uri="{FF2B5EF4-FFF2-40B4-BE49-F238E27FC236}">
+                <a16:creationId xmlns:a16="http://schemas.microsoft.com/office/drawing/2014/main" id="{CDB6E190-6533-42C4-B7E6-657D0E0F76F2}"/>
+              </a:ext>
+            </a:extLst>
+          </p:cNvPr>
+          <p:cNvPicPr>
+            <a:picLocks noChangeAspect="1"/>
+          </p:cNvPicPr>
+          <p:nvPr/>
+        </p:nvPicPr>
+        <p:blipFill>
+          <a:blip r:embed="rId2"/>
+          <a:stretch>
+            <a:fillRect/>
+          </a:stretch>
+        </p:blipFill>
+        <p:spPr>
+          <a:xfrm>
+            <a:off x="8342312" y="1905000"/>
+            <a:ext cx="3162300" cy="3863340"/>
+          </a:xfrm>
+          <a:prstGeom prst="rect">
+            <a:avLst/>
+          </a:prstGeom>
+        </p:spPr>
+      </p:pic>
     </p:spTree>
     <p:extLst>
       <p:ext uri="{BB962C8B-B14F-4D97-AF65-F5344CB8AC3E}">
-        <p14:creationId xmlns:p14="http://schemas.microsoft.com/office/powerpoint/2010/main" val="1624615401"/>
+        <p14:creationId xmlns:p14="http://schemas.microsoft.com/office/powerpoint/2010/main" val="3876710044"/>
       </p:ext>
     </p:extLst>
   </p:cSld>
@@ -7924,7 +7995,7 @@
           <p:cNvPr id="2" name="Title 1">
             <a:extLst>
               <a:ext uri="{FF2B5EF4-FFF2-40B4-BE49-F238E27FC236}">
-                <a16:creationId xmlns:a16="http://schemas.microsoft.com/office/drawing/2014/main" id="{D7B3A905-1609-4D21-AE6E-B179D89C886A}"/>
+                <a16:creationId xmlns:a16="http://schemas.microsoft.com/office/drawing/2014/main" id="{E252AFD4-4B8C-4B39-8FDF-BCD7BC939CB5}"/>
               </a:ext>
             </a:extLst>
           </p:cNvPr>
@@ -7935,19 +8006,14 @@
             <p:ph type="title"/>
           </p:nvPr>
         </p:nvSpPr>
-        <p:spPr>
-          <a:xfrm>
-            <a:off x="2589212" y="3381966"/>
-            <a:ext cx="8911687" cy="1280890"/>
-          </a:xfrm>
-        </p:spPr>
+        <p:spPr/>
         <p:txBody>
           <a:bodyPr/>
           <a:lstStyle/>
           <a:p>
             <a:r>
               <a:rPr lang="it-IT" dirty="0"/>
-              <a:t>Grazie per l’attenzione!</a:t>
+              <a:t>Assegnazione tracker-detection</a:t>
             </a:r>
           </a:p>
         </p:txBody>
@@ -7957,7 +8023,7 @@
           <p:cNvPr id="3" name="Content Placeholder 2">
             <a:extLst>
               <a:ext uri="{FF2B5EF4-FFF2-40B4-BE49-F238E27FC236}">
-                <a16:creationId xmlns:a16="http://schemas.microsoft.com/office/drawing/2014/main" id="{B50F95BC-9F5B-4EC0-83C6-0E68D7BE24B2}"/>
+                <a16:creationId xmlns:a16="http://schemas.microsoft.com/office/drawing/2014/main" id="{E2902596-0C6C-49B2-8C8F-D4A695DEAD03}"/>
               </a:ext>
             </a:extLst>
           </p:cNvPr>
@@ -7978,17 +8044,75 @@
           <a:bodyPr/>
           <a:lstStyle/>
           <a:p>
-            <a:pPr marL="0" indent="0">
-              <a:buNone/>
+            <a:r>
+              <a:rPr lang="it-IT" dirty="0"/>
+              <a:t>Calcolare un valore di similarià per ogni coppia tracker-detection:</a:t>
+            </a:r>
+          </a:p>
+          <a:p>
+            <a:pPr lvl="1">
+              <a:buFont typeface="Wingdings" panose="05000000000000000000" pitchFamily="2" charset="2"/>
+              <a:buChar char="§"/>
             </a:pPr>
-            <a:endParaRPr lang="it-IT" dirty="0"/>
+            <a:r>
+              <a:rPr lang="it-IT" dirty="0"/>
+              <a:t>Intersection over Union (IoU)</a:t>
+            </a:r>
+          </a:p>
+          <a:p>
+            <a:pPr lvl="1">
+              <a:buFont typeface="Wingdings" panose="05000000000000000000" pitchFamily="2" charset="2"/>
+              <a:buChar char="§"/>
+            </a:pPr>
+            <a:r>
+              <a:rPr lang="it-IT" dirty="0"/>
+              <a:t>Dimensione delle aree</a:t>
+            </a:r>
+          </a:p>
+          <a:p>
+            <a:pPr lvl="1">
+              <a:buFont typeface="Wingdings" panose="05000000000000000000" pitchFamily="2" charset="2"/>
+              <a:buChar char="§"/>
+            </a:pPr>
+            <a:r>
+              <a:rPr lang="it-IT" dirty="0"/>
+              <a:t>Rapporto tra i lati</a:t>
+            </a:r>
+          </a:p>
+          <a:p>
+            <a:r>
+              <a:rPr lang="it-IT" dirty="0"/>
+              <a:t>Effettuare gli assegnamenti massimizzando il valore di similarità:</a:t>
+            </a:r>
+          </a:p>
+          <a:p>
+            <a:pPr lvl="1">
+              <a:buFont typeface="Wingdings" panose="05000000000000000000" pitchFamily="2" charset="2"/>
+              <a:buChar char="§"/>
+            </a:pPr>
+            <a:r>
+              <a:rPr lang="it-IT" dirty="0"/>
+              <a:t>Problema di ottimizzazione: algoritmo di Munkres</a:t>
+            </a:r>
+          </a:p>
+          <a:p>
+            <a:r>
+              <a:rPr lang="it-IT" dirty="0"/>
+              <a:t>Creare nuovi tracker per tracciare eventuali nuovi oggetti</a:t>
+            </a:r>
+          </a:p>
+          <a:p>
+            <a:r>
+              <a:rPr lang="it-IT" dirty="0"/>
+              <a:t>Cancellare i trackers che da troppo frames non sono più stati assegnati</a:t>
+            </a:r>
           </a:p>
         </p:txBody>
       </p:sp>
     </p:spTree>
     <p:extLst>
       <p:ext uri="{BB962C8B-B14F-4D97-AF65-F5344CB8AC3E}">
-        <p14:creationId xmlns:p14="http://schemas.microsoft.com/office/powerpoint/2010/main" val="4107545995"/>
+        <p14:creationId xmlns:p14="http://schemas.microsoft.com/office/powerpoint/2010/main" val="1931463893"/>
       </p:ext>
     </p:extLst>
   </p:cSld>
@@ -8020,6 +8144,189 @@
           <p:cNvPr id="2" name="Title 1">
             <a:extLst>
               <a:ext uri="{FF2B5EF4-FFF2-40B4-BE49-F238E27FC236}">
+                <a16:creationId xmlns:a16="http://schemas.microsoft.com/office/drawing/2014/main" id="{5A3EA494-A7DC-4D0E-90A8-D05FCC66E925}"/>
+              </a:ext>
+            </a:extLst>
+          </p:cNvPr>
+          <p:cNvSpPr>
+            <a:spLocks noGrp="1"/>
+          </p:cNvSpPr>
+          <p:nvPr>
+            <p:ph type="title"/>
+          </p:nvPr>
+        </p:nvSpPr>
+        <p:spPr/>
+        <p:txBody>
+          <a:bodyPr/>
+          <a:lstStyle/>
+          <a:p>
+            <a:r>
+              <a:rPr lang="it-IT" dirty="0"/>
+              <a:t>Risultati tracking</a:t>
+            </a:r>
+          </a:p>
+        </p:txBody>
+      </p:sp>
+      <p:sp>
+        <p:nvSpPr>
+          <p:cNvPr id="3" name="Content Placeholder 2">
+            <a:extLst>
+              <a:ext uri="{FF2B5EF4-FFF2-40B4-BE49-F238E27FC236}">
+                <a16:creationId xmlns:a16="http://schemas.microsoft.com/office/drawing/2014/main" id="{C5E3C86A-8CEF-476E-969B-197B4F8CAADF}"/>
+              </a:ext>
+            </a:extLst>
+          </p:cNvPr>
+          <p:cNvSpPr>
+            <a:spLocks noGrp="1"/>
+          </p:cNvSpPr>
+          <p:nvPr>
+            <p:ph idx="1"/>
+          </p:nvPr>
+        </p:nvSpPr>
+        <p:spPr/>
+        <p:txBody>
+          <a:bodyPr/>
+          <a:lstStyle/>
+          <a:p>
+            <a:r>
+              <a:rPr lang="it-IT" dirty="0"/>
+              <a:t>Dataset VisDrone2019 formato da video ripresi da un drone</a:t>
+            </a:r>
+          </a:p>
+          <a:p>
+            <a:r>
+              <a:rPr lang="it-IT" dirty="0"/>
+              <a:t>Solo 5 categorie di elementi:</a:t>
+            </a:r>
+          </a:p>
+          <a:p>
+            <a:pPr lvl="1">
+              <a:buFont typeface="Wingdings" panose="05000000000000000000" pitchFamily="2" charset="2"/>
+              <a:buChar char="§"/>
+            </a:pPr>
+            <a:r>
+              <a:rPr lang="it-IT" dirty="0"/>
+              <a:t>Detections molto più semplici rispetto al predente dataset</a:t>
+            </a:r>
+          </a:p>
+          <a:p>
+            <a:r>
+              <a:rPr lang="it-IT" dirty="0"/>
+              <a:t>Circa il 70% degli oggetti vengono tracciati per almeno l’80% della loro durata</a:t>
+            </a:r>
+          </a:p>
+          <a:p>
+            <a:r>
+              <a:rPr lang="it-IT" dirty="0"/>
+              <a:t>Metriche IDF1 e MOTA circa al 50%</a:t>
+            </a:r>
+          </a:p>
+          <a:p>
+            <a:r>
+              <a:rPr lang="it-IT" dirty="0"/>
+              <a:t>Aumentando la qualità della detection aumenta anche la qualità del tracking</a:t>
+            </a:r>
+          </a:p>
+        </p:txBody>
+      </p:sp>
+    </p:spTree>
+    <p:extLst>
+      <p:ext uri="{BB962C8B-B14F-4D97-AF65-F5344CB8AC3E}">
+        <p14:creationId xmlns:p14="http://schemas.microsoft.com/office/powerpoint/2010/main" val="1624615401"/>
+      </p:ext>
+    </p:extLst>
+  </p:cSld>
+  <p:clrMapOvr>
+    <a:masterClrMapping/>
+  </p:clrMapOvr>
+</p:sld>
+</file>
+
+<file path=ppt/slides/slide13.xml><?xml version="1.0" encoding="utf-8"?>
+<p:sld xmlns:a="http://schemas.openxmlformats.org/drawingml/2006/main" xmlns:r="http://schemas.openxmlformats.org/officeDocument/2006/relationships" xmlns:p="http://schemas.openxmlformats.org/presentationml/2006/main">
+  <p:cSld>
+    <p:spTree>
+      <p:nvGrpSpPr>
+        <p:cNvPr id="1" name=""/>
+        <p:cNvGrpSpPr/>
+        <p:nvPr/>
+      </p:nvGrpSpPr>
+      <p:grpSpPr>
+        <a:xfrm>
+          <a:off x="0" y="0"/>
+          <a:ext cx="0" cy="0"/>
+          <a:chOff x="0" y="0"/>
+          <a:chExt cx="0" cy="0"/>
+        </a:xfrm>
+      </p:grpSpPr>
+      <p:sp>
+        <p:nvSpPr>
+          <p:cNvPr id="2" name="Title 1">
+            <a:extLst>
+              <a:ext uri="{FF2B5EF4-FFF2-40B4-BE49-F238E27FC236}">
+                <a16:creationId xmlns:a16="http://schemas.microsoft.com/office/drawing/2014/main" id="{D7B3A905-1609-4D21-AE6E-B179D89C886A}"/>
+              </a:ext>
+            </a:extLst>
+          </p:cNvPr>
+          <p:cNvSpPr>
+            <a:spLocks noGrp="1"/>
+          </p:cNvSpPr>
+          <p:nvPr>
+            <p:ph type="ctrTitle" idx="4294967295"/>
+          </p:nvPr>
+        </p:nvSpPr>
+        <p:spPr>
+          <a:xfrm>
+            <a:off x="3276600" y="2514600"/>
+            <a:ext cx="8915400" cy="2262188"/>
+          </a:xfrm>
+        </p:spPr>
+        <p:txBody>
+          <a:bodyPr/>
+          <a:lstStyle/>
+          <a:p>
+            <a:r>
+              <a:rPr lang="it-IT" dirty="0"/>
+              <a:t>Grazie per l’attenzione!</a:t>
+            </a:r>
+          </a:p>
+        </p:txBody>
+      </p:sp>
+    </p:spTree>
+    <p:extLst>
+      <p:ext uri="{BB962C8B-B14F-4D97-AF65-F5344CB8AC3E}">
+        <p14:creationId xmlns:p14="http://schemas.microsoft.com/office/powerpoint/2010/main" val="4107545995"/>
+      </p:ext>
+    </p:extLst>
+  </p:cSld>
+  <p:clrMapOvr>
+    <a:masterClrMapping/>
+  </p:clrMapOvr>
+</p:sld>
+</file>
+
+<file path=ppt/slides/slide2.xml><?xml version="1.0" encoding="utf-8"?>
+<p:sld xmlns:a="http://schemas.openxmlformats.org/drawingml/2006/main" xmlns:r="http://schemas.openxmlformats.org/officeDocument/2006/relationships" xmlns:p="http://schemas.openxmlformats.org/presentationml/2006/main">
+  <p:cSld>
+    <p:spTree>
+      <p:nvGrpSpPr>
+        <p:cNvPr id="1" name=""/>
+        <p:cNvGrpSpPr/>
+        <p:nvPr/>
+      </p:nvGrpSpPr>
+      <p:grpSpPr>
+        <a:xfrm>
+          <a:off x="0" y="0"/>
+          <a:ext cx="0" cy="0"/>
+          <a:chOff x="0" y="0"/>
+          <a:chExt cx="0" cy="0"/>
+        </a:xfrm>
+      </p:grpSpPr>
+      <p:sp>
+        <p:nvSpPr>
+          <p:cNvPr id="2" name="Title 1">
+            <a:extLst>
+              <a:ext uri="{FF2B5EF4-FFF2-40B4-BE49-F238E27FC236}">
                 <a16:creationId xmlns:a16="http://schemas.microsoft.com/office/drawing/2014/main" id="{A240C0FD-AF9A-4014-A1A1-7BC96B2B56F1}"/>
               </a:ext>
             </a:extLst>
@@ -8038,7 +8345,7 @@
           <a:p>
             <a:r>
               <a:rPr lang="it-IT" dirty="0"/>
-              <a:t>Azienda</a:t>
+              <a:t>Azienda - Studiomapp</a:t>
             </a:r>
           </a:p>
         </p:txBody>
@@ -8061,10 +8368,77 @@
         </p:nvSpPr>
         <p:spPr/>
         <p:txBody>
-          <a:bodyPr/>
+          <a:bodyPr>
+            <a:normAutofit/>
+          </a:bodyPr>
           <a:lstStyle/>
           <a:p>
-            <a:endParaRPr lang="it-IT" dirty="0"/>
+            <a:r>
+              <a:rPr lang="it-IT" dirty="0"/>
+              <a:t> Startup innovativa fondata a ﬁne 2015 con sede a Ravenna</a:t>
+            </a:r>
+          </a:p>
+          <a:p>
+            <a:r>
+              <a:rPr lang="it-IT" dirty="0"/>
+              <a:t>Sviluppa algoritmi di intelligenza artiﬁciale speciﬁci per geo-calcolo e dati geo-spaziali</a:t>
+            </a:r>
+          </a:p>
+          <a:p>
+            <a:r>
+              <a:rPr lang="it-IT" dirty="0"/>
+              <a:t>Fornisce soluzioni innovative per:</a:t>
+            </a:r>
+          </a:p>
+          <a:p>
+            <a:pPr lvl="1">
+              <a:buFont typeface="Wingdings" panose="05000000000000000000" pitchFamily="2" charset="2"/>
+              <a:buChar char="§"/>
+            </a:pPr>
+            <a:r>
+              <a:rPr lang="it-IT" dirty="0"/>
+              <a:t>Smart cities</a:t>
+            </a:r>
+          </a:p>
+          <a:p>
+            <a:pPr lvl="1">
+              <a:buFont typeface="Wingdings" panose="05000000000000000000" pitchFamily="2" charset="2"/>
+              <a:buChar char="§"/>
+            </a:pPr>
+            <a:r>
+              <a:rPr lang="it-IT" dirty="0"/>
+              <a:t>Trasporti e logistica</a:t>
+            </a:r>
+          </a:p>
+          <a:p>
+            <a:pPr lvl="1">
+              <a:buFont typeface="Wingdings" panose="05000000000000000000" pitchFamily="2" charset="2"/>
+              <a:buChar char="§"/>
+            </a:pPr>
+            <a:r>
+              <a:rPr lang="it-IT" dirty="0"/>
+              <a:t>Turismo e beni culturali</a:t>
+            </a:r>
+          </a:p>
+          <a:p>
+            <a:pPr lvl="1">
+              <a:buFont typeface="Wingdings" panose="05000000000000000000" pitchFamily="2" charset="2"/>
+              <a:buChar char="§"/>
+            </a:pPr>
+            <a:r>
+              <a:rPr lang="it-IT" dirty="0"/>
+              <a:t>Territorio e gestione delle risorse naturali</a:t>
+            </a:r>
+          </a:p>
+          <a:p>
+            <a:pPr lvl="1">
+              <a:buFont typeface="Wingdings" panose="05000000000000000000" pitchFamily="2" charset="2"/>
+              <a:buChar char="§"/>
+            </a:pPr>
+            <a:r>
+              <a:rPr lang="it-IT" dirty="0"/>
+              <a:t>Adattamento ai cambiamenti climatici</a:t>
+            </a:r>
           </a:p>
         </p:txBody>
       </p:sp>
@@ -8081,7 +8455,7 @@
 </p:sld>
 </file>
 
-<file path=ppt/slides/slide2.xml><?xml version="1.0" encoding="utf-8"?>
+<file path=ppt/slides/slide3.xml><?xml version="1.0" encoding="utf-8"?>
 <p:sld xmlns:a="http://schemas.openxmlformats.org/drawingml/2006/main" xmlns:r="http://schemas.openxmlformats.org/officeDocument/2006/relationships" xmlns:p="http://schemas.openxmlformats.org/presentationml/2006/main">
   <p:cSld>
     <p:spTree>
@@ -8314,178 +8688,6 @@
 </p:sld>
 </file>
 
-<file path=ppt/slides/slide3.xml><?xml version="1.0" encoding="utf-8"?>
-<p:sld xmlns:a="http://schemas.openxmlformats.org/drawingml/2006/main" xmlns:r="http://schemas.openxmlformats.org/officeDocument/2006/relationships" xmlns:p="http://schemas.openxmlformats.org/presentationml/2006/main">
-  <p:cSld>
-    <p:spTree>
-      <p:nvGrpSpPr>
-        <p:cNvPr id="1" name=""/>
-        <p:cNvGrpSpPr/>
-        <p:nvPr/>
-      </p:nvGrpSpPr>
-      <p:grpSpPr>
-        <a:xfrm>
-          <a:off x="0" y="0"/>
-          <a:ext cx="0" cy="0"/>
-          <a:chOff x="0" y="0"/>
-          <a:chExt cx="0" cy="0"/>
-        </a:xfrm>
-      </p:grpSpPr>
-      <p:sp>
-        <p:nvSpPr>
-          <p:cNvPr id="2" name="Title 1">
-            <a:extLst>
-              <a:ext uri="{FF2B5EF4-FFF2-40B4-BE49-F238E27FC236}">
-                <a16:creationId xmlns:a16="http://schemas.microsoft.com/office/drawing/2014/main" id="{921AC9A0-7C92-4E95-8DF3-271506A23991}"/>
-              </a:ext>
-            </a:extLst>
-          </p:cNvPr>
-          <p:cNvSpPr>
-            <a:spLocks noGrp="1"/>
-          </p:cNvSpPr>
-          <p:nvPr>
-            <p:ph type="title"/>
-          </p:nvPr>
-        </p:nvSpPr>
-        <p:spPr/>
-        <p:txBody>
-          <a:bodyPr/>
-          <a:lstStyle/>
-          <a:p>
-            <a:r>
-              <a:rPr lang="it-IT" dirty="0"/>
-              <a:t>Object detection</a:t>
-            </a:r>
-          </a:p>
-        </p:txBody>
-      </p:sp>
-      <p:sp>
-        <p:nvSpPr>
-          <p:cNvPr id="3" name="Content Placeholder 2">
-            <a:extLst>
-              <a:ext uri="{FF2B5EF4-FFF2-40B4-BE49-F238E27FC236}">
-                <a16:creationId xmlns:a16="http://schemas.microsoft.com/office/drawing/2014/main" id="{3D402E34-B50F-4DDB-AF2E-25242C591A8F}"/>
-              </a:ext>
-            </a:extLst>
-          </p:cNvPr>
-          <p:cNvSpPr>
-            <a:spLocks noGrp="1"/>
-          </p:cNvSpPr>
-          <p:nvPr>
-            <p:ph idx="1"/>
-          </p:nvPr>
-        </p:nvSpPr>
-        <p:spPr>
-          <a:xfrm>
-            <a:off x="2589212" y="2133599"/>
-            <a:ext cx="8915400" cy="3876584"/>
-          </a:xfrm>
-        </p:spPr>
-        <p:txBody>
-          <a:bodyPr/>
-          <a:lstStyle/>
-          <a:p>
-            <a:r>
-              <a:rPr lang="it-IT" dirty="0"/>
-              <a:t>Interpretare il contenuto di un immagine</a:t>
-            </a:r>
-          </a:p>
-          <a:p>
-            <a:r>
-              <a:rPr lang="it-IT" dirty="0"/>
-              <a:t>Riconoscere gli elementi presenti in essa:</a:t>
-            </a:r>
-          </a:p>
-          <a:p>
-            <a:pPr marL="685800" lvl="1">
-              <a:buFont typeface="Wingdings" panose="05000000000000000000" pitchFamily="2" charset="2"/>
-              <a:buChar char="§"/>
-            </a:pPr>
-            <a:r>
-              <a:rPr lang="it-IT" dirty="0"/>
-              <a:t>Bounding box</a:t>
-            </a:r>
-          </a:p>
-          <a:p>
-            <a:pPr marL="685800" lvl="1">
-              <a:buFont typeface="Wingdings" panose="05000000000000000000" pitchFamily="2" charset="2"/>
-              <a:buChar char="§"/>
-            </a:pPr>
-            <a:r>
-              <a:rPr lang="it-IT" dirty="0"/>
-              <a:t>Categoria</a:t>
-            </a:r>
-          </a:p>
-          <a:p>
-            <a:pPr marL="685800" lvl="1">
-              <a:buFont typeface="Wingdings" panose="05000000000000000000" pitchFamily="2" charset="2"/>
-              <a:buChar char="§"/>
-            </a:pPr>
-            <a:r>
-              <a:rPr lang="it-IT" dirty="0"/>
-              <a:t>Probabilità</a:t>
-            </a:r>
-          </a:p>
-          <a:p>
-            <a:r>
-              <a:rPr lang="it-IT" dirty="0"/>
-              <a:t>Stato dell’arte:</a:t>
-            </a:r>
-          </a:p>
-          <a:p>
-            <a:pPr lvl="1">
-              <a:buFont typeface="Wingdings" panose="05000000000000000000" pitchFamily="2" charset="2"/>
-              <a:buChar char="§"/>
-            </a:pPr>
-            <a:r>
-              <a:rPr lang="it-IT" dirty="0"/>
-              <a:t>Convolutional neural network</a:t>
-            </a:r>
-          </a:p>
-          <a:p>
-            <a:pPr lvl="1">
-              <a:buFont typeface="Wingdings" panose="05000000000000000000" pitchFamily="2" charset="2"/>
-              <a:buChar char="§"/>
-            </a:pPr>
-            <a:r>
-              <a:rPr lang="it-IT" dirty="0"/>
-              <a:t>Faster R-CNN</a:t>
-            </a:r>
-          </a:p>
-          <a:p>
-            <a:pPr marL="0" indent="0">
-              <a:buNone/>
-            </a:pPr>
-            <a:endParaRPr lang="it-IT" dirty="0"/>
-          </a:p>
-          <a:p>
-            <a:pPr marL="285750">
-              <a:buFont typeface="Wingdings" panose="05000000000000000000" pitchFamily="2" charset="2"/>
-              <a:buChar char="§"/>
-            </a:pPr>
-            <a:endParaRPr lang="it-IT" dirty="0"/>
-          </a:p>
-          <a:p>
-            <a:pPr marL="0" indent="0">
-              <a:buNone/>
-            </a:pPr>
-            <a:endParaRPr lang="it-IT" dirty="0"/>
-          </a:p>
-        </p:txBody>
-      </p:sp>
-    </p:spTree>
-    <p:extLst>
-      <p:ext uri="{BB962C8B-B14F-4D97-AF65-F5344CB8AC3E}">
-        <p14:creationId xmlns:p14="http://schemas.microsoft.com/office/powerpoint/2010/main" val="3935917731"/>
-      </p:ext>
-    </p:extLst>
-  </p:cSld>
-  <p:clrMapOvr>
-    <a:masterClrMapping/>
-  </p:clrMapOvr>
-</p:sld>
-</file>
-
 <file path=ppt/slides/slide4.xml><?xml version="1.0" encoding="utf-8"?>
 <p:sld xmlns:a="http://schemas.openxmlformats.org/drawingml/2006/main" xmlns:r="http://schemas.openxmlformats.org/officeDocument/2006/relationships" xmlns:p="http://schemas.openxmlformats.org/presentationml/2006/main">
   <p:cSld>
@@ -8508,7 +8710,7 @@
           <p:cNvPr id="2" name="Title 1">
             <a:extLst>
               <a:ext uri="{FF2B5EF4-FFF2-40B4-BE49-F238E27FC236}">
-                <a16:creationId xmlns:a16="http://schemas.microsoft.com/office/drawing/2014/main" id="{412BCB4B-AD7C-4E8C-B829-3F4C010364CF}"/>
+                <a16:creationId xmlns:a16="http://schemas.microsoft.com/office/drawing/2014/main" id="{921AC9A0-7C92-4E95-8DF3-271506A23991}"/>
               </a:ext>
             </a:extLst>
           </p:cNvPr>
@@ -8526,7 +8728,7 @@
           <a:p>
             <a:r>
               <a:rPr lang="it-IT" dirty="0"/>
-              <a:t>Object detection con frammentazione</a:t>
+              <a:t>Object detection</a:t>
             </a:r>
           </a:p>
         </p:txBody>
@@ -8536,7 +8738,7 @@
           <p:cNvPr id="3" name="Content Placeholder 2">
             <a:extLst>
               <a:ext uri="{FF2B5EF4-FFF2-40B4-BE49-F238E27FC236}">
-                <a16:creationId xmlns:a16="http://schemas.microsoft.com/office/drawing/2014/main" id="{B229F08F-AE02-49CA-8BA3-FC6CB5AB0F6F}"/>
+                <a16:creationId xmlns:a16="http://schemas.microsoft.com/office/drawing/2014/main" id="{3D402E34-B50F-4DDB-AF2E-25242C591A8F}"/>
               </a:ext>
             </a:extLst>
           </p:cNvPr>
@@ -8544,62 +8746,135 @@
             <a:spLocks noGrp="1"/>
           </p:cNvSpPr>
           <p:nvPr>
-            <p:ph idx="1"/>
-          </p:nvPr>
-        </p:nvSpPr>
+            <p:ph sz="half" idx="1"/>
+          </p:nvPr>
+        </p:nvSpPr>
+        <p:spPr/>
+        <p:txBody>
+          <a:bodyPr/>
+          <a:lstStyle/>
+          <a:p>
+            <a:r>
+              <a:rPr lang="it-IT" dirty="0"/>
+              <a:t>Interpretare il contenuto di un immagine</a:t>
+            </a:r>
+          </a:p>
+          <a:p>
+            <a:r>
+              <a:rPr lang="it-IT" dirty="0"/>
+              <a:t>Riconoscere gli elementi presenti in essa:</a:t>
+            </a:r>
+          </a:p>
+          <a:p>
+            <a:pPr marL="685800" lvl="1">
+              <a:buFont typeface="Wingdings" panose="05000000000000000000" pitchFamily="2" charset="2"/>
+              <a:buChar char="§"/>
+            </a:pPr>
+            <a:r>
+              <a:rPr lang="it-IT" dirty="0"/>
+              <a:t>Bounding box</a:t>
+            </a:r>
+          </a:p>
+          <a:p>
+            <a:pPr marL="685800" lvl="1">
+              <a:buFont typeface="Wingdings" panose="05000000000000000000" pitchFamily="2" charset="2"/>
+              <a:buChar char="§"/>
+            </a:pPr>
+            <a:r>
+              <a:rPr lang="it-IT" dirty="0"/>
+              <a:t>Categoria</a:t>
+            </a:r>
+          </a:p>
+          <a:p>
+            <a:pPr marL="685800" lvl="1">
+              <a:buFont typeface="Wingdings" panose="05000000000000000000" pitchFamily="2" charset="2"/>
+              <a:buChar char="§"/>
+            </a:pPr>
+            <a:r>
+              <a:rPr lang="it-IT" dirty="0"/>
+              <a:t>Probabilità</a:t>
+            </a:r>
+          </a:p>
+          <a:p>
+            <a:r>
+              <a:rPr lang="it-IT" dirty="0"/>
+              <a:t>Stato dell’arte:</a:t>
+            </a:r>
+          </a:p>
+          <a:p>
+            <a:pPr lvl="1">
+              <a:buFont typeface="Wingdings" panose="05000000000000000000" pitchFamily="2" charset="2"/>
+              <a:buChar char="§"/>
+            </a:pPr>
+            <a:r>
+              <a:rPr lang="it-IT" dirty="0"/>
+              <a:t>Convolutional neural network</a:t>
+            </a:r>
+          </a:p>
+          <a:p>
+            <a:pPr lvl="1">
+              <a:buFont typeface="Wingdings" panose="05000000000000000000" pitchFamily="2" charset="2"/>
+              <a:buChar char="§"/>
+            </a:pPr>
+            <a:r>
+              <a:rPr lang="it-IT" dirty="0"/>
+              <a:t>Faster R-CNN</a:t>
+            </a:r>
+          </a:p>
+          <a:p>
+            <a:pPr marL="0" indent="0">
+              <a:buNone/>
+            </a:pPr>
+            <a:endParaRPr lang="it-IT" dirty="0"/>
+          </a:p>
+          <a:p>
+            <a:pPr marL="285750">
+              <a:buFont typeface="Wingdings" panose="05000000000000000000" pitchFamily="2" charset="2"/>
+              <a:buChar char="§"/>
+            </a:pPr>
+            <a:endParaRPr lang="it-IT" dirty="0"/>
+          </a:p>
+          <a:p>
+            <a:pPr marL="0" indent="0">
+              <a:buNone/>
+            </a:pPr>
+            <a:endParaRPr lang="it-IT" dirty="0"/>
+          </a:p>
+        </p:txBody>
+      </p:sp>
+      <p:pic>
+        <p:nvPicPr>
+          <p:cNvPr id="6" name="Content Placeholder 5">
+            <a:extLst>
+              <a:ext uri="{FF2B5EF4-FFF2-40B4-BE49-F238E27FC236}">
+                <a16:creationId xmlns:a16="http://schemas.microsoft.com/office/drawing/2014/main" id="{6E4025A9-78BF-4C58-9C08-431A5DF98518}"/>
+              </a:ext>
+            </a:extLst>
+          </p:cNvPr>
+          <p:cNvPicPr>
+            <a:picLocks noGrp="1" noChangeAspect="1"/>
+          </p:cNvPicPr>
+          <p:nvPr>
+            <p:ph sz="half" idx="2"/>
+          </p:nvPr>
+        </p:nvPicPr>
+        <p:blipFill>
+          <a:blip r:embed="rId2"/>
+          <a:stretch>
+            <a:fillRect/>
+          </a:stretch>
+        </p:blipFill>
         <p:spPr>
           <a:xfrm>
-            <a:off x="2589212" y="1905000"/>
-            <a:ext cx="8915400" cy="3777622"/>
+            <a:off x="7441474" y="2125662"/>
+            <a:ext cx="3820416" cy="3785559"/>
           </a:xfrm>
         </p:spPr>
-        <p:txBody>
-          <a:bodyPr>
-            <a:normAutofit/>
-          </a:bodyPr>
-          <a:lstStyle/>
-          <a:p>
-            <a:r>
-              <a:rPr lang="it-IT" dirty="0"/>
-              <a:t>Suddividere un’ immagine in regioni</a:t>
-            </a:r>
-          </a:p>
-          <a:p>
-            <a:r>
-              <a:rPr lang="it-IT" dirty="0"/>
-              <a:t>Effettuare la detection su una regione alla volta</a:t>
-            </a:r>
-          </a:p>
-          <a:p>
-            <a:r>
-              <a:rPr lang="it-IT" dirty="0"/>
-              <a:t>Problema: uno stesso elemento può venire individuato più volte</a:t>
-            </a:r>
-          </a:p>
-          <a:p>
-            <a:r>
-              <a:rPr lang="it-IT" dirty="0"/>
-              <a:t>Non-max suppression da solo non è sufficiente</a:t>
-            </a:r>
-          </a:p>
-          <a:p>
-            <a:r>
-              <a:rPr lang="it-IT" dirty="0"/>
-              <a:t>Algoritmo per ricomporre le detections frammentate</a:t>
-            </a:r>
-          </a:p>
-          <a:p>
-            <a:r>
-              <a:rPr lang="it-IT" dirty="0"/>
-              <a:t>Individuare detections che potrebbero appartenere allo stesso elemento e ricomporle</a:t>
-            </a:r>
-          </a:p>
-        </p:txBody>
-      </p:sp>
+      </p:pic>
     </p:spTree>
     <p:extLst>
       <p:ext uri="{BB962C8B-B14F-4D97-AF65-F5344CB8AC3E}">
-        <p14:creationId xmlns:p14="http://schemas.microsoft.com/office/powerpoint/2010/main" val="2060602867"/>
+        <p14:creationId xmlns:p14="http://schemas.microsoft.com/office/powerpoint/2010/main" val="3935917731"/>
       </p:ext>
     </p:extLst>
   </p:cSld>
@@ -8631,6 +8906,263 @@
           <p:cNvPr id="2" name="Title 1">
             <a:extLst>
               <a:ext uri="{FF2B5EF4-FFF2-40B4-BE49-F238E27FC236}">
+                <a16:creationId xmlns:a16="http://schemas.microsoft.com/office/drawing/2014/main" id="{D6CEC00C-99AD-430C-A927-0888AD6D476B}"/>
+              </a:ext>
+            </a:extLst>
+          </p:cNvPr>
+          <p:cNvSpPr>
+            <a:spLocks noGrp="1"/>
+          </p:cNvSpPr>
+          <p:nvPr>
+            <p:ph type="title"/>
+          </p:nvPr>
+        </p:nvSpPr>
+        <p:spPr/>
+        <p:txBody>
+          <a:bodyPr/>
+          <a:lstStyle/>
+          <a:p>
+            <a:r>
+              <a:rPr lang="it-IT" dirty="0"/>
+              <a:t>Tre motivi per preferire lavorare su immagini in bassa risoluzione </a:t>
+            </a:r>
+          </a:p>
+        </p:txBody>
+      </p:sp>
+      <p:sp>
+        <p:nvSpPr>
+          <p:cNvPr id="3" name="Content Placeholder 2">
+            <a:extLst>
+              <a:ext uri="{FF2B5EF4-FFF2-40B4-BE49-F238E27FC236}">
+                <a16:creationId xmlns:a16="http://schemas.microsoft.com/office/drawing/2014/main" id="{5CA15545-D967-4C8E-B12B-6235E34A7EF8}"/>
+              </a:ext>
+            </a:extLst>
+          </p:cNvPr>
+          <p:cNvSpPr>
+            <a:spLocks noGrp="1"/>
+          </p:cNvSpPr>
+          <p:nvPr>
+            <p:ph idx="1"/>
+          </p:nvPr>
+        </p:nvSpPr>
+        <p:spPr/>
+        <p:txBody>
+          <a:bodyPr/>
+          <a:lstStyle/>
+          <a:p>
+            <a:r>
+              <a:rPr lang="it-IT" dirty="0"/>
+              <a:t>La maggior parte dei modelli esistenti lavorano su immagini in bassa risoluzione:</a:t>
+            </a:r>
+          </a:p>
+          <a:p>
+            <a:pPr lvl="1">
+              <a:buFont typeface="Wingdings" panose="05000000000000000000" pitchFamily="2" charset="2"/>
+              <a:buChar char="§"/>
+            </a:pPr>
+            <a:r>
+              <a:rPr lang="it-IT" dirty="0"/>
+              <a:t>Le immagini troppo grandi verranno automaticamente ridimensionate</a:t>
+            </a:r>
+          </a:p>
+          <a:p>
+            <a:pPr lvl="1">
+              <a:buFont typeface="Wingdings" panose="05000000000000000000" pitchFamily="2" charset="2"/>
+              <a:buChar char="§"/>
+            </a:pPr>
+            <a:r>
+              <a:rPr lang="it-IT" dirty="0"/>
+              <a:t>Perdita di risoluzione!</a:t>
+            </a:r>
+          </a:p>
+          <a:p>
+            <a:r>
+              <a:rPr lang="it-IT" dirty="0"/>
+              <a:t>Processare immagini a bassa risoluzione è più efficiente</a:t>
+            </a:r>
+          </a:p>
+          <a:p>
+            <a:r>
+              <a:rPr lang="it-IT" dirty="0"/>
+              <a:t>I dataset attuali per allenare i modelli sono composti da milioni in immagini in bassa risoluzione (ImageNet):</a:t>
+            </a:r>
+          </a:p>
+          <a:p>
+            <a:pPr lvl="1">
+              <a:buFont typeface="Wingdings" panose="05000000000000000000" pitchFamily="2" charset="2"/>
+              <a:buChar char="§"/>
+            </a:pPr>
+            <a:r>
+              <a:rPr lang="it-IT" dirty="0"/>
+              <a:t>I modelli che lavorano su immagini in alta definizione sono più difficili da allenare</a:t>
+            </a:r>
+          </a:p>
+        </p:txBody>
+      </p:sp>
+    </p:spTree>
+    <p:extLst>
+      <p:ext uri="{BB962C8B-B14F-4D97-AF65-F5344CB8AC3E}">
+        <p14:creationId xmlns:p14="http://schemas.microsoft.com/office/powerpoint/2010/main" val="3888445872"/>
+      </p:ext>
+    </p:extLst>
+  </p:cSld>
+  <p:clrMapOvr>
+    <a:masterClrMapping/>
+  </p:clrMapOvr>
+</p:sld>
+</file>
+
+<file path=ppt/slides/slide6.xml><?xml version="1.0" encoding="utf-8"?>
+<p:sld xmlns:a="http://schemas.openxmlformats.org/drawingml/2006/main" xmlns:r="http://schemas.openxmlformats.org/officeDocument/2006/relationships" xmlns:p="http://schemas.openxmlformats.org/presentationml/2006/main">
+  <p:cSld>
+    <p:spTree>
+      <p:nvGrpSpPr>
+        <p:cNvPr id="1" name=""/>
+        <p:cNvGrpSpPr/>
+        <p:nvPr/>
+      </p:nvGrpSpPr>
+      <p:grpSpPr>
+        <a:xfrm>
+          <a:off x="0" y="0"/>
+          <a:ext cx="0" cy="0"/>
+          <a:chOff x="0" y="0"/>
+          <a:chExt cx="0" cy="0"/>
+        </a:xfrm>
+      </p:grpSpPr>
+      <p:sp>
+        <p:nvSpPr>
+          <p:cNvPr id="2" name="Title 1">
+            <a:extLst>
+              <a:ext uri="{FF2B5EF4-FFF2-40B4-BE49-F238E27FC236}">
+                <a16:creationId xmlns:a16="http://schemas.microsoft.com/office/drawing/2014/main" id="{412BCB4B-AD7C-4E8C-B829-3F4C010364CF}"/>
+              </a:ext>
+            </a:extLst>
+          </p:cNvPr>
+          <p:cNvSpPr>
+            <a:spLocks noGrp="1"/>
+          </p:cNvSpPr>
+          <p:nvPr>
+            <p:ph type="title"/>
+          </p:nvPr>
+        </p:nvSpPr>
+        <p:spPr>
+          <a:xfrm>
+            <a:off x="2592925" y="624110"/>
+            <a:ext cx="8911687" cy="1280890"/>
+          </a:xfrm>
+        </p:spPr>
+        <p:txBody>
+          <a:bodyPr/>
+          <a:lstStyle/>
+          <a:p>
+            <a:r>
+              <a:rPr lang="it-IT"/>
+              <a:t>Object detection con frammentazione</a:t>
+            </a:r>
+            <a:endParaRPr lang="it-IT" dirty="0"/>
+          </a:p>
+        </p:txBody>
+      </p:sp>
+      <p:sp>
+        <p:nvSpPr>
+          <p:cNvPr id="3" name="Content Placeholder 2">
+            <a:extLst>
+              <a:ext uri="{FF2B5EF4-FFF2-40B4-BE49-F238E27FC236}">
+                <a16:creationId xmlns:a16="http://schemas.microsoft.com/office/drawing/2014/main" id="{B229F08F-AE02-49CA-8BA3-FC6CB5AB0F6F}"/>
+              </a:ext>
+            </a:extLst>
+          </p:cNvPr>
+          <p:cNvSpPr>
+            <a:spLocks noGrp="1"/>
+          </p:cNvSpPr>
+          <p:nvPr>
+            <p:ph idx="1"/>
+          </p:nvPr>
+        </p:nvSpPr>
+        <p:spPr>
+          <a:xfrm>
+            <a:off x="2583911" y="1905000"/>
+            <a:ext cx="8915400" cy="2781300"/>
+          </a:xfrm>
+        </p:spPr>
+        <p:txBody>
+          <a:bodyPr>
+            <a:normAutofit/>
+          </a:bodyPr>
+          <a:lstStyle/>
+          <a:p>
+            <a:r>
+              <a:rPr lang="it-IT" dirty="0"/>
+              <a:t>Suddividere un’ immagine in regioni</a:t>
+            </a:r>
+          </a:p>
+          <a:p>
+            <a:r>
+              <a:rPr lang="it-IT" dirty="0"/>
+              <a:t>Effettuare la detection su una regione alla volta</a:t>
+            </a:r>
+          </a:p>
+          <a:p>
+            <a:r>
+              <a:rPr lang="it-IT" dirty="0"/>
+              <a:t>Problema: uno stesso elemento può venire individuato più volte</a:t>
+            </a:r>
+          </a:p>
+          <a:p>
+            <a:r>
+              <a:rPr lang="it-IT" dirty="0"/>
+              <a:t>Non-max suppression da solo non è sufficiente</a:t>
+            </a:r>
+          </a:p>
+          <a:p>
+            <a:r>
+              <a:rPr lang="it-IT" dirty="0"/>
+              <a:t>Algoritmo per ricomporre le detections frammentate</a:t>
+            </a:r>
+          </a:p>
+          <a:p>
+            <a:r>
+              <a:rPr lang="it-IT" dirty="0"/>
+              <a:t>Individuare detections che potrebbero appartenere allo stesso elemento e ricomporle</a:t>
+            </a:r>
+          </a:p>
+        </p:txBody>
+      </p:sp>
+    </p:spTree>
+    <p:extLst>
+      <p:ext uri="{BB962C8B-B14F-4D97-AF65-F5344CB8AC3E}">
+        <p14:creationId xmlns:p14="http://schemas.microsoft.com/office/powerpoint/2010/main" val="2060602867"/>
+      </p:ext>
+    </p:extLst>
+  </p:cSld>
+  <p:clrMapOvr>
+    <a:masterClrMapping/>
+  </p:clrMapOvr>
+</p:sld>
+</file>
+
+<file path=ppt/slides/slide7.xml><?xml version="1.0" encoding="utf-8"?>
+<p:sld xmlns:a="http://schemas.openxmlformats.org/drawingml/2006/main" xmlns:r="http://schemas.openxmlformats.org/officeDocument/2006/relationships" xmlns:p="http://schemas.openxmlformats.org/presentationml/2006/main">
+  <p:cSld>
+    <p:spTree>
+      <p:nvGrpSpPr>
+        <p:cNvPr id="1" name=""/>
+        <p:cNvGrpSpPr/>
+        <p:nvPr/>
+      </p:nvGrpSpPr>
+      <p:grpSpPr>
+        <a:xfrm>
+          <a:off x="0" y="0"/>
+          <a:ext cx="0" cy="0"/>
+          <a:chOff x="0" y="0"/>
+          <a:chExt cx="0" cy="0"/>
+        </a:xfrm>
+      </p:grpSpPr>
+      <p:sp>
+        <p:nvSpPr>
+          <p:cNvPr id="2" name="Title 1">
+            <a:extLst>
+              <a:ext uri="{FF2B5EF4-FFF2-40B4-BE49-F238E27FC236}">
                 <a16:creationId xmlns:a16="http://schemas.microsoft.com/office/drawing/2014/main" id="{3F052D9B-8A7C-428E-B559-91E776E8C0E7}"/>
               </a:ext>
             </a:extLst>
@@ -8771,7 +9303,7 @@
 </p:sld>
 </file>
 
-<file path=ppt/slides/slide6.xml><?xml version="1.0" encoding="utf-8"?>
+<file path=ppt/slides/slide8.xml><?xml version="1.0" encoding="utf-8"?>
 <p:sld xmlns:a="http://schemas.openxmlformats.org/drawingml/2006/main" xmlns:r="http://schemas.openxmlformats.org/officeDocument/2006/relationships" xmlns:p="http://schemas.openxmlformats.org/presentationml/2006/main">
   <p:cSld>
     <p:spTree>
@@ -8841,7 +9373,7 @@
           <a:p>
             <a:r>
               <a:rPr lang="it-IT" dirty="0"/>
-              <a:t>Dataset xView composto da immagini satellitari</a:t>
+              <a:t>Dataset xView composto da immagini satellitari (70 categorie diverse)</a:t>
             </a:r>
           </a:p>
           <a:p>
@@ -8918,172 +9450,6 @@
 </p:sld>
 </file>
 
-<file path=ppt/slides/slide7.xml><?xml version="1.0" encoding="utf-8"?>
-<p:sld xmlns:a="http://schemas.openxmlformats.org/drawingml/2006/main" xmlns:r="http://schemas.openxmlformats.org/officeDocument/2006/relationships" xmlns:p="http://schemas.openxmlformats.org/presentationml/2006/main">
-  <p:cSld>
-    <p:spTree>
-      <p:nvGrpSpPr>
-        <p:cNvPr id="1" name=""/>
-        <p:cNvGrpSpPr/>
-        <p:nvPr/>
-      </p:nvGrpSpPr>
-      <p:grpSpPr>
-        <a:xfrm>
-          <a:off x="0" y="0"/>
-          <a:ext cx="0" cy="0"/>
-          <a:chOff x="0" y="0"/>
-          <a:chExt cx="0" cy="0"/>
-        </a:xfrm>
-      </p:grpSpPr>
-      <p:sp>
-        <p:nvSpPr>
-          <p:cNvPr id="2" name="Title 1">
-            <a:extLst>
-              <a:ext uri="{FF2B5EF4-FFF2-40B4-BE49-F238E27FC236}">
-                <a16:creationId xmlns:a16="http://schemas.microsoft.com/office/drawing/2014/main" id="{3A14B910-F2C2-41A2-8F5A-EDA91E88E0B0}"/>
-              </a:ext>
-            </a:extLst>
-          </p:cNvPr>
-          <p:cNvSpPr>
-            <a:spLocks noGrp="1"/>
-          </p:cNvSpPr>
-          <p:nvPr>
-            <p:ph type="title"/>
-          </p:nvPr>
-        </p:nvSpPr>
-        <p:spPr/>
-        <p:txBody>
-          <a:bodyPr/>
-          <a:lstStyle/>
-          <a:p>
-            <a:r>
-              <a:rPr lang="it-IT" dirty="0"/>
-              <a:t>Object tracking</a:t>
-            </a:r>
-          </a:p>
-        </p:txBody>
-      </p:sp>
-      <p:sp>
-        <p:nvSpPr>
-          <p:cNvPr id="3" name="Content Placeholder 2">
-            <a:extLst>
-              <a:ext uri="{FF2B5EF4-FFF2-40B4-BE49-F238E27FC236}">
-                <a16:creationId xmlns:a16="http://schemas.microsoft.com/office/drawing/2014/main" id="{6F4F2FC1-0862-4D81-B2CF-8ED984A31904}"/>
-              </a:ext>
-            </a:extLst>
-          </p:cNvPr>
-          <p:cNvSpPr>
-            <a:spLocks noGrp="1"/>
-          </p:cNvSpPr>
-          <p:nvPr>
-            <p:ph idx="1"/>
-          </p:nvPr>
-        </p:nvSpPr>
-        <p:spPr/>
-        <p:txBody>
-          <a:bodyPr/>
-          <a:lstStyle/>
-          <a:p>
-            <a:endParaRPr lang="it-IT"/>
-          </a:p>
-        </p:txBody>
-      </p:sp>
-    </p:spTree>
-    <p:extLst>
-      <p:ext uri="{BB962C8B-B14F-4D97-AF65-F5344CB8AC3E}">
-        <p14:creationId xmlns:p14="http://schemas.microsoft.com/office/powerpoint/2010/main" val="2571033219"/>
-      </p:ext>
-    </p:extLst>
-  </p:cSld>
-  <p:clrMapOvr>
-    <a:masterClrMapping/>
-  </p:clrMapOvr>
-</p:sld>
-</file>
-
-<file path=ppt/slides/slide8.xml><?xml version="1.0" encoding="utf-8"?>
-<p:sld xmlns:a="http://schemas.openxmlformats.org/drawingml/2006/main" xmlns:r="http://schemas.openxmlformats.org/officeDocument/2006/relationships" xmlns:p="http://schemas.openxmlformats.org/presentationml/2006/main">
-  <p:cSld>
-    <p:spTree>
-      <p:nvGrpSpPr>
-        <p:cNvPr id="1" name=""/>
-        <p:cNvGrpSpPr/>
-        <p:nvPr/>
-      </p:nvGrpSpPr>
-      <p:grpSpPr>
-        <a:xfrm>
-          <a:off x="0" y="0"/>
-          <a:ext cx="0" cy="0"/>
-          <a:chOff x="0" y="0"/>
-          <a:chExt cx="0" cy="0"/>
-        </a:xfrm>
-      </p:grpSpPr>
-      <p:sp>
-        <p:nvSpPr>
-          <p:cNvPr id="2" name="Title 1">
-            <a:extLst>
-              <a:ext uri="{FF2B5EF4-FFF2-40B4-BE49-F238E27FC236}">
-                <a16:creationId xmlns:a16="http://schemas.microsoft.com/office/drawing/2014/main" id="{880234B8-62BD-4942-89C3-807122800625}"/>
-              </a:ext>
-            </a:extLst>
-          </p:cNvPr>
-          <p:cNvSpPr>
-            <a:spLocks noGrp="1"/>
-          </p:cNvSpPr>
-          <p:nvPr>
-            <p:ph type="title"/>
-          </p:nvPr>
-        </p:nvSpPr>
-        <p:spPr/>
-        <p:txBody>
-          <a:bodyPr/>
-          <a:lstStyle/>
-          <a:p>
-            <a:r>
-              <a:rPr lang="it-IT" dirty="0"/>
-              <a:t>Risultati tracking 1</a:t>
-            </a:r>
-          </a:p>
-        </p:txBody>
-      </p:sp>
-      <p:sp>
-        <p:nvSpPr>
-          <p:cNvPr id="3" name="Content Placeholder 2">
-            <a:extLst>
-              <a:ext uri="{FF2B5EF4-FFF2-40B4-BE49-F238E27FC236}">
-                <a16:creationId xmlns:a16="http://schemas.microsoft.com/office/drawing/2014/main" id="{BE7E5635-38AB-42B2-BE9B-80154B2A7B02}"/>
-              </a:ext>
-            </a:extLst>
-          </p:cNvPr>
-          <p:cNvSpPr>
-            <a:spLocks noGrp="1"/>
-          </p:cNvSpPr>
-          <p:nvPr>
-            <p:ph idx="1"/>
-          </p:nvPr>
-        </p:nvSpPr>
-        <p:spPr/>
-        <p:txBody>
-          <a:bodyPr/>
-          <a:lstStyle/>
-          <a:p>
-            <a:endParaRPr lang="it-IT"/>
-          </a:p>
-        </p:txBody>
-      </p:sp>
-    </p:spTree>
-    <p:extLst>
-      <p:ext uri="{BB962C8B-B14F-4D97-AF65-F5344CB8AC3E}">
-        <p14:creationId xmlns:p14="http://schemas.microsoft.com/office/powerpoint/2010/main" val="3876710044"/>
-      </p:ext>
-    </p:extLst>
-  </p:cSld>
-  <p:clrMapOvr>
-    <a:masterClrMapping/>
-  </p:clrMapOvr>
-</p:sld>
-</file>
-
 <file path=ppt/slides/slide9.xml><?xml version="1.0" encoding="utf-8"?>
 <p:sld xmlns:a="http://schemas.openxmlformats.org/drawingml/2006/main" xmlns:r="http://schemas.openxmlformats.org/officeDocument/2006/relationships" xmlns:p="http://schemas.openxmlformats.org/presentationml/2006/main">
   <p:cSld>
@@ -9106,7 +9472,7 @@
           <p:cNvPr id="2" name="Title 1">
             <a:extLst>
               <a:ext uri="{FF2B5EF4-FFF2-40B4-BE49-F238E27FC236}">
-                <a16:creationId xmlns:a16="http://schemas.microsoft.com/office/drawing/2014/main" id="{E252AFD4-4B8C-4B39-8FDF-BCD7BC939CB5}"/>
+                <a16:creationId xmlns:a16="http://schemas.microsoft.com/office/drawing/2014/main" id="{3A14B910-F2C2-41A2-8F5A-EDA91E88E0B0}"/>
               </a:ext>
             </a:extLst>
           </p:cNvPr>
@@ -9124,7 +9490,7 @@
           <a:p>
             <a:r>
               <a:rPr lang="it-IT" dirty="0"/>
-              <a:t>Risultati tracking 2</a:t>
+              <a:t>Object tracking</a:t>
             </a:r>
           </a:p>
         </p:txBody>
@@ -9134,7 +9500,7 @@
           <p:cNvPr id="3" name="Content Placeholder 2">
             <a:extLst>
               <a:ext uri="{FF2B5EF4-FFF2-40B4-BE49-F238E27FC236}">
-                <a16:creationId xmlns:a16="http://schemas.microsoft.com/office/drawing/2014/main" id="{E2902596-0C6C-49B2-8C8F-D4A695DEAD03}"/>
+                <a16:creationId xmlns:a16="http://schemas.microsoft.com/office/drawing/2014/main" id="{6F4F2FC1-0862-4D81-B2CF-8ED984A31904}"/>
               </a:ext>
             </a:extLst>
           </p:cNvPr>
@@ -9150,14 +9516,115 @@
           <a:bodyPr/>
           <a:lstStyle/>
           <a:p>
-            <a:endParaRPr lang="it-IT"/>
-          </a:p>
-        </p:txBody>
-      </p:sp>
+            <a:r>
+              <a:rPr lang="it-IT" dirty="0"/>
+              <a:t>Tracciare specifici elementi attraverso una sequenza di frames</a:t>
+            </a:r>
+          </a:p>
+          <a:p>
+            <a:r>
+              <a:rPr lang="it-IT" dirty="0"/>
+              <a:t>Assegnazione di un ID univoco ad ogni elemento tracciato</a:t>
+            </a:r>
+          </a:p>
+          <a:p>
+            <a:r>
+              <a:rPr lang="it-IT" dirty="0"/>
+              <a:t>Tracciando un oggetto in movimento possono sorgere alcuni dei seguenti problemi:</a:t>
+            </a:r>
+          </a:p>
+          <a:p>
+            <a:pPr lvl="1">
+              <a:buFont typeface="Wingdings" panose="05000000000000000000" pitchFamily="2" charset="2"/>
+              <a:buChar char="§"/>
+            </a:pPr>
+            <a:r>
+              <a:rPr lang="it-IT" dirty="0"/>
+              <a:t>Occlusione</a:t>
+            </a:r>
+          </a:p>
+          <a:p>
+            <a:pPr lvl="1">
+              <a:buFont typeface="Wingdings" panose="05000000000000000000" pitchFamily="2" charset="2"/>
+              <a:buChar char="§"/>
+            </a:pPr>
+            <a:r>
+              <a:rPr lang="it-IT" dirty="0"/>
+              <a:t>Sfocatura</a:t>
+            </a:r>
+          </a:p>
+          <a:p>
+            <a:pPr lvl="1">
+              <a:buFont typeface="Wingdings" panose="05000000000000000000" pitchFamily="2" charset="2"/>
+              <a:buChar char="§"/>
+            </a:pPr>
+            <a:r>
+              <a:rPr lang="it-IT" dirty="0"/>
+              <a:t>Background</a:t>
+            </a:r>
+          </a:p>
+          <a:p>
+            <a:pPr lvl="1">
+              <a:buFont typeface="Wingdings" panose="05000000000000000000" pitchFamily="2" charset="2"/>
+              <a:buChar char="§"/>
+            </a:pPr>
+            <a:r>
+              <a:rPr lang="it-IT" dirty="0"/>
+              <a:t>Luminosità</a:t>
+            </a:r>
+          </a:p>
+          <a:p>
+            <a:pPr lvl="1">
+              <a:buFont typeface="Wingdings" panose="05000000000000000000" pitchFamily="2" charset="2"/>
+              <a:buChar char="§"/>
+            </a:pPr>
+            <a:r>
+              <a:rPr lang="it-IT" dirty="0"/>
+              <a:t>Etc...</a:t>
+            </a:r>
+          </a:p>
+          <a:p>
+            <a:pPr marL="57150" indent="0">
+              <a:buNone/>
+            </a:pPr>
+            <a:endParaRPr lang="it-IT" dirty="0"/>
+          </a:p>
+        </p:txBody>
+      </p:sp>
+      <p:pic>
+        <p:nvPicPr>
+          <p:cNvPr id="7" name="Picture 6">
+            <a:extLst>
+              <a:ext uri="{FF2B5EF4-FFF2-40B4-BE49-F238E27FC236}">
+                <a16:creationId xmlns:a16="http://schemas.microsoft.com/office/drawing/2014/main" id="{C0B15A55-FA5B-42D5-A288-5E3D43D4B41B}"/>
+              </a:ext>
+            </a:extLst>
+          </p:cNvPr>
+          <p:cNvPicPr>
+            <a:picLocks noChangeAspect="1"/>
+          </p:cNvPicPr>
+          <p:nvPr/>
+        </p:nvPicPr>
+        <p:blipFill>
+          <a:blip r:embed="rId2"/>
+          <a:stretch>
+            <a:fillRect/>
+          </a:stretch>
+        </p:blipFill>
+        <p:spPr>
+          <a:xfrm>
+            <a:off x="5086904" y="4630333"/>
+            <a:ext cx="6417707" cy="1280889"/>
+          </a:xfrm>
+          <a:prstGeom prst="rect">
+            <a:avLst/>
+          </a:prstGeom>
+        </p:spPr>
+      </p:pic>
     </p:spTree>
     <p:extLst>
       <p:ext uri="{BB962C8B-B14F-4D97-AF65-F5344CB8AC3E}">
-        <p14:creationId xmlns:p14="http://schemas.microsoft.com/office/powerpoint/2010/main" val="1931463893"/>
+        <p14:creationId xmlns:p14="http://schemas.microsoft.com/office/powerpoint/2010/main" val="2571033219"/>
       </p:ext>
     </p:extLst>
   </p:cSld>

</xml_diff>

<commit_message>
corrected minor grammar problems
</commit_message>
<xml_diff>
--- a/presentazione_tesi.pptx
+++ b/presentazione_tesi.pptx
@@ -334,7 +334,7 @@
             <a:fld id="{B61BEF0D-F0BB-DE4B-95CE-6DB70DBA9567}" type="datetimeFigureOut">
               <a:rPr lang="en-US" dirty="0"/>
               <a:pPr/>
-              <a:t>7/2/2019</a:t>
+              <a:t>7/8/2019</a:t>
             </a:fld>
             <a:endParaRPr lang="en-US" dirty="0"/>
           </a:p>
@@ -669,7 +669,7 @@
             <a:fld id="{B61BEF0D-F0BB-DE4B-95CE-6DB70DBA9567}" type="datetimeFigureOut">
               <a:rPr lang="en-US" dirty="0"/>
               <a:pPr/>
-              <a:t>7/2/2019</a:t>
+              <a:t>7/8/2019</a:t>
             </a:fld>
             <a:endParaRPr lang="en-US" dirty="0"/>
           </a:p>
@@ -1067,7 +1067,7 @@
             <a:fld id="{B61BEF0D-F0BB-DE4B-95CE-6DB70DBA9567}" type="datetimeFigureOut">
               <a:rPr lang="en-US" dirty="0"/>
               <a:pPr/>
-              <a:t>7/2/2019</a:t>
+              <a:t>7/8/2019</a:t>
             </a:fld>
             <a:endParaRPr lang="en-US" dirty="0"/>
           </a:p>
@@ -1400,7 +1400,7 @@
             <a:fld id="{B61BEF0D-F0BB-DE4B-95CE-6DB70DBA9567}" type="datetimeFigureOut">
               <a:rPr lang="en-US" dirty="0"/>
               <a:pPr/>
-              <a:t>7/2/2019</a:t>
+              <a:t>7/8/2019</a:t>
             </a:fld>
             <a:endParaRPr lang="en-US" dirty="0"/>
           </a:p>
@@ -1717,7 +1717,7 @@
             <a:fld id="{B61BEF0D-F0BB-DE4B-95CE-6DB70DBA9567}" type="datetimeFigureOut">
               <a:rPr lang="en-US" dirty="0"/>
               <a:pPr/>
-              <a:t>7/2/2019</a:t>
+              <a:t>7/8/2019</a:t>
             </a:fld>
             <a:endParaRPr lang="en-US" dirty="0"/>
           </a:p>
@@ -2110,7 +2110,7 @@
             <a:fld id="{B61BEF0D-F0BB-DE4B-95CE-6DB70DBA9567}" type="datetimeFigureOut">
               <a:rPr lang="en-US" dirty="0"/>
               <a:pPr/>
-              <a:t>7/2/2019</a:t>
+              <a:t>7/8/2019</a:t>
             </a:fld>
             <a:endParaRPr lang="en-US" dirty="0"/>
           </a:p>
@@ -2364,7 +2364,7 @@
             <a:fld id="{B61BEF0D-F0BB-DE4B-95CE-6DB70DBA9567}" type="datetimeFigureOut">
               <a:rPr lang="en-US" dirty="0"/>
               <a:pPr/>
-              <a:t>7/2/2019</a:t>
+              <a:t>7/8/2019</a:t>
             </a:fld>
             <a:endParaRPr lang="en-US" dirty="0"/>
           </a:p>
@@ -2623,7 +2623,7 @@
             <a:fld id="{B61BEF0D-F0BB-DE4B-95CE-6DB70DBA9567}" type="datetimeFigureOut">
               <a:rPr lang="en-US" dirty="0"/>
               <a:pPr/>
-              <a:t>7/2/2019</a:t>
+              <a:t>7/8/2019</a:t>
             </a:fld>
             <a:endParaRPr lang="en-US" dirty="0"/>
           </a:p>
@@ -2882,7 +2882,7 @@
             <a:fld id="{B61BEF0D-F0BB-DE4B-95CE-6DB70DBA9567}" type="datetimeFigureOut">
               <a:rPr lang="en-US" dirty="0"/>
               <a:pPr/>
-              <a:t>7/2/2019</a:t>
+              <a:t>7/8/2019</a:t>
             </a:fld>
             <a:endParaRPr lang="en-US" dirty="0"/>
           </a:p>
@@ -3208,7 +3208,7 @@
             <a:fld id="{B61BEF0D-F0BB-DE4B-95CE-6DB70DBA9567}" type="datetimeFigureOut">
               <a:rPr lang="en-US" dirty="0"/>
               <a:pPr/>
-              <a:t>7/2/2019</a:t>
+              <a:t>7/8/2019</a:t>
             </a:fld>
             <a:endParaRPr lang="en-US" dirty="0"/>
           </a:p>
@@ -3528,7 +3528,7 @@
             <a:fld id="{B61BEF0D-F0BB-DE4B-95CE-6DB70DBA9567}" type="datetimeFigureOut">
               <a:rPr lang="en-US" dirty="0"/>
               <a:pPr/>
-              <a:t>7/2/2019</a:t>
+              <a:t>7/8/2019</a:t>
             </a:fld>
             <a:endParaRPr lang="en-US" dirty="0"/>
           </a:p>
@@ -3982,7 +3982,7 @@
             <a:fld id="{B61BEF0D-F0BB-DE4B-95CE-6DB70DBA9567}" type="datetimeFigureOut">
               <a:rPr lang="en-US" dirty="0"/>
               <a:pPr/>
-              <a:t>7/2/2019</a:t>
+              <a:t>7/8/2019</a:t>
             </a:fld>
             <a:endParaRPr lang="en-US" dirty="0"/>
           </a:p>
@@ -4184,7 +4184,7 @@
             <a:fld id="{B61BEF0D-F0BB-DE4B-95CE-6DB70DBA9567}" type="datetimeFigureOut">
               <a:rPr lang="en-US" dirty="0"/>
               <a:pPr/>
-              <a:t>7/2/2019</a:t>
+              <a:t>7/8/2019</a:t>
             </a:fld>
             <a:endParaRPr lang="en-US" dirty="0"/>
           </a:p>
@@ -4358,7 +4358,7 @@
             <a:fld id="{B61BEF0D-F0BB-DE4B-95CE-6DB70DBA9567}" type="datetimeFigureOut">
               <a:rPr lang="en-US" dirty="0"/>
               <a:pPr/>
-              <a:t>7/2/2019</a:t>
+              <a:t>7/8/2019</a:t>
             </a:fld>
             <a:endParaRPr lang="en-US" dirty="0"/>
           </a:p>
@@ -4688,7 +4688,7 @@
             <a:fld id="{B61BEF0D-F0BB-DE4B-95CE-6DB70DBA9567}" type="datetimeFigureOut">
               <a:rPr lang="en-US" dirty="0"/>
               <a:pPr/>
-              <a:t>7/2/2019</a:t>
+              <a:t>7/8/2019</a:t>
             </a:fld>
             <a:endParaRPr lang="en-US" dirty="0"/>
           </a:p>
@@ -5030,7 +5030,7 @@
             <a:fld id="{B61BEF0D-F0BB-DE4B-95CE-6DB70DBA9567}" type="datetimeFigureOut">
               <a:rPr lang="en-US" dirty="0"/>
               <a:pPr/>
-              <a:t>7/2/2019</a:t>
+              <a:t>7/8/2019</a:t>
             </a:fld>
             <a:endParaRPr lang="en-US" dirty="0"/>
           </a:p>
@@ -7144,7 +7144,7 @@
             <a:fld id="{B61BEF0D-F0BB-DE4B-95CE-6DB70DBA9567}" type="datetimeFigureOut">
               <a:rPr lang="en-US" dirty="0"/>
               <a:pPr/>
-              <a:t>7/2/2019</a:t>
+              <a:t>7/8/2019</a:t>
             </a:fld>
             <a:endParaRPr lang="en-US" dirty="0"/>
           </a:p>
@@ -7687,13 +7687,13 @@
           <a:p>
             <a:pPr algn="ctr"/>
             <a:r>
-              <a:rPr lang="it-IT" dirty="0"/>
+              <a:rPr lang="it-IT" b="1" dirty="0"/>
               <a:t>Riconoscimento e tracciamento di elementi su video ad alta risoluzione</a:t>
             </a:r>
             <a:br>
-              <a:rPr lang="it-IT" dirty="0"/>
+              <a:rPr lang="it-IT" b="1" dirty="0"/>
             </a:br>
-            <a:endParaRPr lang="it-IT" dirty="0"/>
+            <a:endParaRPr lang="it-IT" b="1" dirty="0"/>
           </a:p>
         </p:txBody>
       </p:sp>

</xml_diff>